<commit_message>
Finished a complete version of the notebook with prose.
</commit_message>
<xml_diff>
--- a/talks/2019-1105-lale.pptx
+++ b/talks/2019-1105-lale.pptx
@@ -29986,41 +29986,6 @@
           </a:p>
         </p:txBody>
       </p:sp>
-      <p:pic>
-        <p:nvPicPr>
-          <p:cNvPr id="7" name="Picture 6">
-            <a:extLst>
-              <a:ext uri="{FF2B5EF4-FFF2-40B4-BE49-F238E27FC236}">
-                <a16:creationId xmlns:a16="http://schemas.microsoft.com/office/drawing/2014/main" id="{5CF7C753-C8EC-43AC-B5E0-D24431588681}"/>
-              </a:ext>
-            </a:extLst>
-          </p:cNvPr>
-          <p:cNvPicPr>
-            <a:picLocks noChangeAspect="1"/>
-          </p:cNvPicPr>
-          <p:nvPr/>
-        </p:nvPicPr>
-        <p:blipFill>
-          <a:blip r:embed="rId2"/>
-          <a:stretch>
-            <a:fillRect/>
-          </a:stretch>
-        </p:blipFill>
-        <p:spPr>
-          <a:xfrm>
-            <a:off x="4310033" y="5071127"/>
-            <a:ext cx="5448300" cy="1209675"/>
-          </a:xfrm>
-          <a:prstGeom prst="rect">
-            <a:avLst/>
-          </a:prstGeom>
-          <a:ln w="6350">
-            <a:solidFill>
-              <a:schemeClr val="tx1"/>
-            </a:solidFill>
-          </a:ln>
-        </p:spPr>
-      </p:pic>
       <p:grpSp>
         <p:nvGrpSpPr>
           <p:cNvPr id="8" name="Group 17">
@@ -30733,12 +30698,12 @@
         </p:nvSpPr>
         <p:spPr>
           <a:xfrm>
-            <a:off x="9692353" y="5167146"/>
+            <a:off x="9692353" y="5184490"/>
             <a:ext cx="914400" cy="914400"/>
           </a:xfrm>
           <a:prstGeom prst="arc">
             <a:avLst>
-              <a:gd name="adj1" fmla="val 13432601"/>
+              <a:gd name="adj1" fmla="val 13513321"/>
               <a:gd name="adj2" fmla="val 8125546"/>
             </a:avLst>
           </a:prstGeom>
@@ -30786,8 +30751,8 @@
         </p:nvSpPr>
         <p:spPr>
           <a:xfrm>
-            <a:off x="10606753" y="5347941"/>
-            <a:ext cx="1056700" cy="646331"/>
+            <a:off x="10591513" y="5180025"/>
+            <a:ext cx="941283" cy="923330"/>
           </a:xfrm>
           <a:prstGeom prst="rect">
             <a:avLst/>
@@ -30815,7 +30780,214 @@
               <a:rPr lang="en-US">
                 <a:latin typeface="Arial" panose="020B0604020202020204" pitchFamily="34" charset="0"/>
               </a:rPr>
-              <a:t>fit, score</a:t>
+              <a:t>fit,</a:t>
+            </a:r>
+            <a:br>
+              <a:rPr lang="en-US">
+                <a:latin typeface="Arial" panose="020B0604020202020204" pitchFamily="34" charset="0"/>
+              </a:rPr>
+            </a:br>
+            <a:r>
+              <a:rPr lang="en-US">
+                <a:latin typeface="Arial" panose="020B0604020202020204" pitchFamily="34" charset="0"/>
+              </a:rPr>
+              <a:t>score</a:t>
+            </a:r>
+          </a:p>
+        </p:txBody>
+      </p:sp>
+      <p:sp>
+        <p:nvSpPr>
+          <p:cNvPr id="2" name="TextBox 1">
+            <a:extLst>
+              <a:ext uri="{FF2B5EF4-FFF2-40B4-BE49-F238E27FC236}">
+                <a16:creationId xmlns:a16="http://schemas.microsoft.com/office/drawing/2014/main" id="{B7532BC2-DDC2-4C1A-BFB4-BE48F75026CE}"/>
+              </a:ext>
+            </a:extLst>
+          </p:cNvPr>
+          <p:cNvSpPr txBox="1"/>
+          <p:nvPr/>
+        </p:nvSpPr>
+        <p:spPr>
+          <a:xfrm>
+            <a:off x="4274234" y="5136047"/>
+            <a:ext cx="5551520" cy="1092607"/>
+          </a:xfrm>
+          <a:prstGeom prst="rect">
+            <a:avLst/>
+          </a:prstGeom>
+          <a:solidFill>
+            <a:srgbClr val="F7F7F7"/>
+          </a:solidFill>
+          <a:ln>
+            <a:solidFill>
+              <a:schemeClr val="tx1"/>
+            </a:solidFill>
+          </a:ln>
+        </p:spPr>
+        <p:txBody>
+          <a:bodyPr wrap="none" rtlCol="0">
+            <a:spAutoFit/>
+          </a:bodyPr>
+          <a:lstStyle/>
+          <a:p>
+            <a:r>
+              <a:rPr lang="en-US" sz="1300">
+                <a:latin typeface="Courier New" panose="02070309020205020404" pitchFamily="49" charset="0"/>
+              </a:rPr>
+              <a:t>pipeline </a:t>
+            </a:r>
+            <a:r>
+              <a:rPr lang="en-US" sz="1300" b="1">
+                <a:solidFill>
+                  <a:srgbClr val="A336FE"/>
+                </a:solidFill>
+                <a:latin typeface="Courier New" panose="02070309020205020404" pitchFamily="49" charset="0"/>
+              </a:rPr>
+              <a:t>=</a:t>
+            </a:r>
+            <a:r>
+              <a:rPr lang="en-US" sz="1300">
+                <a:latin typeface="Courier New" panose="02070309020205020404" pitchFamily="49" charset="0"/>
+              </a:rPr>
+              <a:t> (</a:t>
+            </a:r>
+          </a:p>
+          <a:p>
+            <a:r>
+              <a:rPr lang="en-US" sz="1300">
+                <a:latin typeface="Courier New" panose="02070309020205020404" pitchFamily="49" charset="0"/>
+              </a:rPr>
+              <a:t>     (  Project(columns={'type': 'number'}) </a:t>
+            </a:r>
+            <a:r>
+              <a:rPr lang="en-US" sz="1300" b="1">
+                <a:solidFill>
+                  <a:srgbClr val="A336FE"/>
+                </a:solidFill>
+                <a:latin typeface="Courier New" panose="02070309020205020404" pitchFamily="49" charset="0"/>
+              </a:rPr>
+              <a:t>&gt;&gt;</a:t>
+            </a:r>
+            <a:r>
+              <a:rPr lang="en-US" sz="1300">
+                <a:latin typeface="Courier New" panose="02070309020205020404" pitchFamily="49" charset="0"/>
+              </a:rPr>
+              <a:t> Norm</a:t>
+            </a:r>
+          </a:p>
+          <a:p>
+            <a:r>
+              <a:rPr lang="en-US" sz="1300">
+                <a:latin typeface="Courier New" panose="02070309020205020404" pitchFamily="49" charset="0"/>
+              </a:rPr>
+              <a:t>      </a:t>
+            </a:r>
+            <a:r>
+              <a:rPr lang="en-US" sz="1300" b="1">
+                <a:solidFill>
+                  <a:srgbClr val="A336FE"/>
+                </a:solidFill>
+                <a:latin typeface="Courier New" panose="02070309020205020404" pitchFamily="49" charset="0"/>
+              </a:rPr>
+              <a:t>&amp;</a:t>
+            </a:r>
+            <a:r>
+              <a:rPr lang="en-US" sz="1300">
+                <a:latin typeface="Courier New" panose="02070309020205020404" pitchFamily="49" charset="0"/>
+              </a:rPr>
+              <a:t> Project(columns={'type': 'string'}) </a:t>
+            </a:r>
+            <a:r>
+              <a:rPr lang="en-US" sz="1300" b="1">
+                <a:solidFill>
+                  <a:srgbClr val="A336FE"/>
+                </a:solidFill>
+                <a:latin typeface="Courier New" panose="02070309020205020404" pitchFamily="49" charset="0"/>
+              </a:rPr>
+              <a:t>&gt;&gt;</a:t>
+            </a:r>
+            <a:r>
+              <a:rPr lang="en-US" sz="1300">
+                <a:latin typeface="Courier New" panose="02070309020205020404" pitchFamily="49" charset="0"/>
+              </a:rPr>
+              <a:t> OneHot)</a:t>
+            </a:r>
+          </a:p>
+          <a:p>
+            <a:r>
+              <a:rPr lang="en-US" sz="1300">
+                <a:latin typeface="Courier New" panose="02070309020205020404" pitchFamily="49" charset="0"/>
+              </a:rPr>
+              <a:t>  </a:t>
+            </a:r>
+            <a:r>
+              <a:rPr lang="en-US" sz="1300" b="1">
+                <a:solidFill>
+                  <a:srgbClr val="A336FE"/>
+                </a:solidFill>
+                <a:latin typeface="Courier New" panose="02070309020205020404" pitchFamily="49" charset="0"/>
+              </a:rPr>
+              <a:t>&gt;&gt;</a:t>
+            </a:r>
+            <a:r>
+              <a:rPr lang="en-US" sz="1300">
+                <a:latin typeface="Courier New" panose="02070309020205020404" pitchFamily="49" charset="0"/>
+              </a:rPr>
+              <a:t> Concat</a:t>
+            </a:r>
+          </a:p>
+          <a:p>
+            <a:r>
+              <a:rPr lang="en-US" sz="1300">
+                <a:latin typeface="Courier New" panose="02070309020205020404" pitchFamily="49" charset="0"/>
+              </a:rPr>
+              <a:t>  </a:t>
+            </a:r>
+            <a:r>
+              <a:rPr lang="en-US" sz="1300" b="1">
+                <a:solidFill>
+                  <a:srgbClr val="A336FE"/>
+                </a:solidFill>
+                <a:latin typeface="Courier New" panose="02070309020205020404" pitchFamily="49" charset="0"/>
+              </a:rPr>
+              <a:t>&gt;&gt;</a:t>
+            </a:r>
+            <a:r>
+              <a:rPr lang="en-US" sz="1300">
+                <a:latin typeface="Courier New" panose="02070309020205020404" pitchFamily="49" charset="0"/>
+              </a:rPr>
+              <a:t> (LR </a:t>
+            </a:r>
+            <a:r>
+              <a:rPr lang="en-US" sz="1300" b="1">
+                <a:solidFill>
+                  <a:srgbClr val="A336FE"/>
+                </a:solidFill>
+                <a:latin typeface="Courier New" panose="02070309020205020404" pitchFamily="49" charset="0"/>
+              </a:rPr>
+              <a:t>|</a:t>
+            </a:r>
+            <a:r>
+              <a:rPr lang="en-US" sz="1300">
+                <a:latin typeface="Courier New" panose="02070309020205020404" pitchFamily="49" charset="0"/>
+              </a:rPr>
+              <a:t> XGBoost </a:t>
+            </a:r>
+            <a:r>
+              <a:rPr lang="en-US" sz="1300" b="1">
+                <a:solidFill>
+                  <a:srgbClr val="A336FE"/>
+                </a:solidFill>
+                <a:latin typeface="Courier New" panose="02070309020205020404" pitchFamily="49" charset="0"/>
+              </a:rPr>
+              <a:t>|</a:t>
+            </a:r>
+            <a:r>
+              <a:rPr lang="en-US" sz="1300">
+                <a:latin typeface="Courier New" panose="02070309020205020404" pitchFamily="49" charset="0"/>
+              </a:rPr>
+              <a:t> LinearSVC))</a:t>
             </a:r>
           </a:p>
         </p:txBody>

</xml_diff>

<commit_message>
Some more tweaks to the slides.
</commit_message>
<xml_diff>
--- a/talks/2019-1105-lale.pptx
+++ b/talks/2019-1105-lale.pptx
@@ -19392,6 +19392,43 @@
           </a:p>
         </p:txBody>
       </p:sp>
+      <p:sp>
+        <p:nvSpPr>
+          <p:cNvPr id="51" name="TextBox 50">
+            <a:extLst>
+              <a:ext uri="{FF2B5EF4-FFF2-40B4-BE49-F238E27FC236}">
+                <a16:creationId xmlns:a16="http://schemas.microsoft.com/office/drawing/2014/main" id="{A1C84246-D24D-4D08-A105-3ED1BA881350}"/>
+              </a:ext>
+            </a:extLst>
+          </p:cNvPr>
+          <p:cNvSpPr txBox="1"/>
+          <p:nvPr/>
+        </p:nvSpPr>
+        <p:spPr>
+          <a:xfrm>
+            <a:off x="895457" y="6358978"/>
+            <a:ext cx="8426346" cy="369332"/>
+          </a:xfrm>
+          <a:prstGeom prst="rect">
+            <a:avLst/>
+          </a:prstGeom>
+          <a:noFill/>
+        </p:spPr>
+        <p:txBody>
+          <a:bodyPr wrap="none" rtlCol="0">
+            <a:spAutoFit/>
+          </a:bodyPr>
+          <a:lstStyle/>
+          <a:p>
+            <a:r>
+              <a:rPr lang="en-US">
+                <a:latin typeface="Arial" panose="020B0604020202020204" pitchFamily="34" charset="0"/>
+              </a:rPr>
+              <a:t>“Type-Driven Automated Learning with Lale”, https://arxiv.org/pdf/1906.03957.pdf</a:t>
+            </a:r>
+          </a:p>
+        </p:txBody>
+      </p:sp>
     </p:spTree>
     <p:extLst>
       <p:ext uri="{BB962C8B-B14F-4D97-AF65-F5344CB8AC3E}">
@@ -22180,7 +22217,7 @@
                 <a:latin typeface="Arial" panose="020B0604020202020204" pitchFamily="34" charset="0"/>
                 <a:cs typeface="Courier New" panose="02070309020205020404" pitchFamily="49" charset="0"/>
               </a:rPr>
-              <a:t>Robustness</a:t>
+              <a:t>More robustness</a:t>
             </a:r>
           </a:p>
           <a:p>
@@ -22906,43 +22943,6 @@
           </a:p>
         </p:txBody>
       </p:sp>
-      <p:sp>
-        <p:nvSpPr>
-          <p:cNvPr id="13" name="TextBox 12">
-            <a:extLst>
-              <a:ext uri="{FF2B5EF4-FFF2-40B4-BE49-F238E27FC236}">
-                <a16:creationId xmlns:a16="http://schemas.microsoft.com/office/drawing/2014/main" id="{1BD207BC-D5EB-48A4-A783-C71D91507AED}"/>
-              </a:ext>
-            </a:extLst>
-          </p:cNvPr>
-          <p:cNvSpPr txBox="1"/>
-          <p:nvPr/>
-        </p:nvSpPr>
-        <p:spPr>
-          <a:xfrm>
-            <a:off x="838200" y="948810"/>
-            <a:ext cx="8840882" cy="369332"/>
-          </a:xfrm>
-          <a:prstGeom prst="rect">
-            <a:avLst/>
-          </a:prstGeom>
-          <a:noFill/>
-        </p:spPr>
-        <p:txBody>
-          <a:bodyPr wrap="none" rtlCol="0">
-            <a:spAutoFit/>
-          </a:bodyPr>
-          <a:lstStyle/>
-          <a:p>
-            <a:r>
-              <a:rPr lang="en-US">
-                <a:latin typeface="Arial" panose="020B0604020202020204" pitchFamily="34" charset="0"/>
-              </a:rPr>
-              <a:t>https://github.ibm.com/Lale/lale-ibm/blob/master/examples/talk_2019-1025-lale.ipynb</a:t>
-            </a:r>
-          </a:p>
-        </p:txBody>
-      </p:sp>
       <p:pic>
         <p:nvPicPr>
           <p:cNvPr id="3" name="Picture 2">
@@ -23003,6 +23003,43 @@
           </a:prstGeom>
         </p:spPr>
       </p:pic>
+      <p:sp>
+        <p:nvSpPr>
+          <p:cNvPr id="13" name="TextBox 12">
+            <a:extLst>
+              <a:ext uri="{FF2B5EF4-FFF2-40B4-BE49-F238E27FC236}">
+                <a16:creationId xmlns:a16="http://schemas.microsoft.com/office/drawing/2014/main" id="{1BD207BC-D5EB-48A4-A783-C71D91507AED}"/>
+              </a:ext>
+            </a:extLst>
+          </p:cNvPr>
+          <p:cNvSpPr txBox="1"/>
+          <p:nvPr/>
+        </p:nvSpPr>
+        <p:spPr>
+          <a:xfrm>
+            <a:off x="895457" y="6358978"/>
+            <a:ext cx="7913257" cy="369332"/>
+          </a:xfrm>
+          <a:prstGeom prst="rect">
+            <a:avLst/>
+          </a:prstGeom>
+          <a:noFill/>
+        </p:spPr>
+        <p:txBody>
+          <a:bodyPr wrap="none" rtlCol="0">
+            <a:spAutoFit/>
+          </a:bodyPr>
+          <a:lstStyle/>
+          <a:p>
+            <a:r>
+              <a:rPr lang="en-US">
+                <a:latin typeface="Arial" panose="020B0604020202020204" pitchFamily="34" charset="0"/>
+              </a:rPr>
+              <a:t>https://github.com/IBM/lale/blob/master/examples/talk_2019-1105-lale.ipynb</a:t>
+            </a:r>
+          </a:p>
+        </p:txBody>
+      </p:sp>
     </p:spTree>
     <p:extLst>
       <p:ext uri="{BB962C8B-B14F-4D97-AF65-F5344CB8AC3E}">
@@ -29568,6 +29605,43 @@
           </a:graphicData>
         </a:graphic>
       </p:graphicFrame>
+      <p:sp>
+        <p:nvSpPr>
+          <p:cNvPr id="16" name="TextBox 15">
+            <a:extLst>
+              <a:ext uri="{FF2B5EF4-FFF2-40B4-BE49-F238E27FC236}">
+                <a16:creationId xmlns:a16="http://schemas.microsoft.com/office/drawing/2014/main" id="{1DCDFC81-3476-46D1-827F-453D04F42E9B}"/>
+              </a:ext>
+            </a:extLst>
+          </p:cNvPr>
+          <p:cNvSpPr txBox="1"/>
+          <p:nvPr/>
+        </p:nvSpPr>
+        <p:spPr>
+          <a:xfrm>
+            <a:off x="895457" y="6358978"/>
+            <a:ext cx="8426346" cy="369332"/>
+          </a:xfrm>
+          <a:prstGeom prst="rect">
+            <a:avLst/>
+          </a:prstGeom>
+          <a:noFill/>
+        </p:spPr>
+        <p:txBody>
+          <a:bodyPr wrap="none" rtlCol="0">
+            <a:spAutoFit/>
+          </a:bodyPr>
+          <a:lstStyle/>
+          <a:p>
+            <a:r>
+              <a:rPr lang="en-US">
+                <a:latin typeface="Arial" panose="020B0604020202020204" pitchFamily="34" charset="0"/>
+              </a:rPr>
+              <a:t>“Type-Driven Automated Learning with Lale”, https://arxiv.org/pdf/1906.03957.pdf</a:t>
+            </a:r>
+          </a:p>
+        </p:txBody>
+      </p:sp>
     </p:spTree>
     <p:extLst>
       <p:ext uri="{BB962C8B-B14F-4D97-AF65-F5344CB8AC3E}">

</xml_diff>